<commit_message>
Responses to Mitya's review. Still a couple of points outstanding
</commit_message>
<xml_diff>
--- a/content/refguide/attachments/runtime/runtime-diagrams.pptx
+++ b/content/refguide/attachments/runtime/runtime-diagrams.pptx
@@ -225,7 +225,7 @@
           <a:p>
             <a:fld id="{048BE5CF-3D99-4B85-885B-56B674E9D77C}" type="datetimeFigureOut">
               <a:rPr lang="en-US" smtClean="0"/>
-              <a:t>4/10/2020</a:t>
+              <a:t>4/16/2020</a:t>
             </a:fld>
             <a:endParaRPr lang="en-US"/>
           </a:p>
@@ -807,7 +807,7 @@
           <a:p>
             <a:fld id="{0FD70F0B-AE21-4F8D-A4A9-BFD22160883F}" type="datetimeFigureOut">
               <a:rPr lang="en-US" smtClean="0"/>
-              <a:t>4/10/2020</a:t>
+              <a:t>4/16/2020</a:t>
             </a:fld>
             <a:endParaRPr lang="en-US"/>
           </a:p>
@@ -1005,7 +1005,7 @@
           <a:p>
             <a:fld id="{0FD70F0B-AE21-4F8D-A4A9-BFD22160883F}" type="datetimeFigureOut">
               <a:rPr lang="en-US" smtClean="0"/>
-              <a:t>4/10/2020</a:t>
+              <a:t>4/16/2020</a:t>
             </a:fld>
             <a:endParaRPr lang="en-US"/>
           </a:p>
@@ -1213,7 +1213,7 @@
           <a:p>
             <a:fld id="{0FD70F0B-AE21-4F8D-A4A9-BFD22160883F}" type="datetimeFigureOut">
               <a:rPr lang="en-US" smtClean="0"/>
-              <a:t>4/10/2020</a:t>
+              <a:t>4/16/2020</a:t>
             </a:fld>
             <a:endParaRPr lang="en-US"/>
           </a:p>
@@ -1411,7 +1411,7 @@
           <a:p>
             <a:fld id="{0FD70F0B-AE21-4F8D-A4A9-BFD22160883F}" type="datetimeFigureOut">
               <a:rPr lang="en-US" smtClean="0"/>
-              <a:t>4/10/2020</a:t>
+              <a:t>4/16/2020</a:t>
             </a:fld>
             <a:endParaRPr lang="en-US"/>
           </a:p>
@@ -1686,7 +1686,7 @@
           <a:p>
             <a:fld id="{0FD70F0B-AE21-4F8D-A4A9-BFD22160883F}" type="datetimeFigureOut">
               <a:rPr lang="en-US" smtClean="0"/>
-              <a:t>4/10/2020</a:t>
+              <a:t>4/16/2020</a:t>
             </a:fld>
             <a:endParaRPr lang="en-US"/>
           </a:p>
@@ -1951,7 +1951,7 @@
           <a:p>
             <a:fld id="{0FD70F0B-AE21-4F8D-A4A9-BFD22160883F}" type="datetimeFigureOut">
               <a:rPr lang="en-US" smtClean="0"/>
-              <a:t>4/10/2020</a:t>
+              <a:t>4/16/2020</a:t>
             </a:fld>
             <a:endParaRPr lang="en-US"/>
           </a:p>
@@ -2363,7 +2363,7 @@
           <a:p>
             <a:fld id="{0FD70F0B-AE21-4F8D-A4A9-BFD22160883F}" type="datetimeFigureOut">
               <a:rPr lang="en-US" smtClean="0"/>
-              <a:t>4/10/2020</a:t>
+              <a:t>4/16/2020</a:t>
             </a:fld>
             <a:endParaRPr lang="en-US"/>
           </a:p>
@@ -2504,7 +2504,7 @@
           <a:p>
             <a:fld id="{0FD70F0B-AE21-4F8D-A4A9-BFD22160883F}" type="datetimeFigureOut">
               <a:rPr lang="en-US" smtClean="0"/>
-              <a:t>4/10/2020</a:t>
+              <a:t>4/16/2020</a:t>
             </a:fld>
             <a:endParaRPr lang="en-US"/>
           </a:p>
@@ -2617,7 +2617,7 @@
           <a:p>
             <a:fld id="{0FD70F0B-AE21-4F8D-A4A9-BFD22160883F}" type="datetimeFigureOut">
               <a:rPr lang="en-US" smtClean="0"/>
-              <a:t>4/10/2020</a:t>
+              <a:t>4/16/2020</a:t>
             </a:fld>
             <a:endParaRPr lang="en-US"/>
           </a:p>
@@ -2928,7 +2928,7 @@
           <a:p>
             <a:fld id="{0FD70F0B-AE21-4F8D-A4A9-BFD22160883F}" type="datetimeFigureOut">
               <a:rPr lang="en-US" smtClean="0"/>
-              <a:t>4/10/2020</a:t>
+              <a:t>4/16/2020</a:t>
             </a:fld>
             <a:endParaRPr lang="en-US"/>
           </a:p>
@@ -3216,7 +3216,7 @@
           <a:p>
             <a:fld id="{0FD70F0B-AE21-4F8D-A4A9-BFD22160883F}" type="datetimeFigureOut">
               <a:rPr lang="en-US" smtClean="0"/>
-              <a:t>4/10/2020</a:t>
+              <a:t>4/16/2020</a:t>
             </a:fld>
             <a:endParaRPr lang="en-US"/>
           </a:p>
@@ -3457,7 +3457,7 @@
           <a:p>
             <a:fld id="{0FD70F0B-AE21-4F8D-A4A9-BFD22160883F}" type="datetimeFigureOut">
               <a:rPr lang="en-US" smtClean="0"/>
-              <a:t>4/10/2020</a:t>
+              <a:t>4/16/2020</a:t>
             </a:fld>
             <a:endParaRPr lang="en-US"/>
           </a:p>
@@ -8617,7 +8617,7 @@
         </p:nvSpPr>
         <p:spPr>
           <a:xfrm>
-            <a:off x="2649877" y="4473685"/>
+            <a:off x="4618115" y="4406837"/>
             <a:ext cx="1241656" cy="570158"/>
           </a:xfrm>
           <a:prstGeom prst="flowChartOnlineStorage">
@@ -8701,7 +8701,7 @@
             <a:pPr algn="ctr"/>
             <a:r>
               <a:rPr lang="en-US" sz="1600" dirty="0"/>
-              <a:t>Online Data</a:t>
+              <a:t>Data API</a:t>
             </a:r>
           </a:p>
         </p:txBody>
@@ -9390,7 +9390,7 @@
         </p:nvSpPr>
         <p:spPr>
           <a:xfrm>
-            <a:off x="565440" y="5043843"/>
+            <a:off x="572913" y="4088966"/>
             <a:ext cx="1260000" cy="570158"/>
           </a:xfrm>
           <a:prstGeom prst="flowChartOnlineStorage">
@@ -9584,14 +9584,14 @@
           <p:cNvCxnSpPr>
             <a:cxnSpLocks/>
             <a:stCxn id="62" idx="3"/>
-            <a:endCxn id="12" idx="1"/>
+            <a:endCxn id="13" idx="1"/>
           </p:cNvCxnSpPr>
           <p:nvPr/>
         </p:nvCxnSpPr>
         <p:spPr>
           <a:xfrm flipV="1">
-            <a:off x="1615440" y="4758764"/>
-            <a:ext cx="1034437" cy="570158"/>
+            <a:off x="1622913" y="3922525"/>
+            <a:ext cx="2036620" cy="451520"/>
           </a:xfrm>
           <a:prstGeom prst="straightConnector1">
             <a:avLst/>
@@ -9941,14 +9941,14 @@
           <p:cNvCxnSpPr>
             <a:cxnSpLocks/>
             <a:stCxn id="12" idx="2"/>
-            <a:endCxn id="14" idx="1"/>
+            <a:endCxn id="14" idx="0"/>
           </p:cNvCxnSpPr>
           <p:nvPr/>
         </p:nvCxnSpPr>
         <p:spPr>
-          <a:xfrm>
-            <a:off x="3270705" y="5043843"/>
-            <a:ext cx="388828" cy="447751"/>
+          <a:xfrm flipH="1">
+            <a:off x="4289533" y="4976995"/>
+            <a:ext cx="949410" cy="226599"/>
           </a:xfrm>
           <a:prstGeom prst="straightConnector1">
             <a:avLst/>
@@ -10120,110 +10120,6 @@
           </a:p>
         </p:txBody>
       </p:sp>
-      <p:sp>
-        <p:nvSpPr>
-          <p:cNvPr id="65" name="Flowchart: Process 64">
-            <a:extLst>
-              <a:ext uri="{FF2B5EF4-FFF2-40B4-BE49-F238E27FC236}">
-                <a16:creationId xmlns:a16="http://schemas.microsoft.com/office/drawing/2014/main" id="{80EEE84C-CCDD-44D3-8612-359E0BB5A4D3}"/>
-              </a:ext>
-            </a:extLst>
-          </p:cNvPr>
-          <p:cNvSpPr/>
-          <p:nvPr/>
-        </p:nvSpPr>
-        <p:spPr>
-          <a:xfrm>
-            <a:off x="8326089" y="3634525"/>
-            <a:ext cx="1260000" cy="576000"/>
-          </a:xfrm>
-          <a:prstGeom prst="flowChartProcess">
-            <a:avLst/>
-          </a:prstGeom>
-          <a:solidFill>
-            <a:schemeClr val="accent2">
-              <a:lumMod val="75000"/>
-            </a:schemeClr>
-          </a:solidFill>
-        </p:spPr>
-        <p:style>
-          <a:lnRef idx="2">
-            <a:schemeClr val="accent1">
-              <a:shade val="50000"/>
-            </a:schemeClr>
-          </a:lnRef>
-          <a:fillRef idx="1">
-            <a:schemeClr val="accent1"/>
-          </a:fillRef>
-          <a:effectRef idx="0">
-            <a:schemeClr val="accent1"/>
-          </a:effectRef>
-          <a:fontRef idx="minor">
-            <a:schemeClr val="lt1"/>
-          </a:fontRef>
-        </p:style>
-        <p:txBody>
-          <a:bodyPr rot="0" spcFirstLastPara="0" vertOverflow="overflow" horzOverflow="overflow" vert="horz" wrap="square" lIns="36000" tIns="36000" rIns="36000" bIns="36000" numCol="1" spcCol="0" rtlCol="0" fromWordArt="0" anchor="ctr" anchorCtr="0" forceAA="0" compatLnSpc="1">
-            <a:prstTxWarp prst="textNoShape">
-              <a:avLst/>
-            </a:prstTxWarp>
-            <a:noAutofit/>
-          </a:bodyPr>
-          <a:lstStyle/>
-          <a:p>
-            <a:pPr algn="ctr"/>
-            <a:r>
-              <a:rPr lang="en-US" sz="1600" dirty="0" err="1"/>
-              <a:t>CodePush</a:t>
-            </a:r>
-            <a:endParaRPr lang="en-US" sz="1600" dirty="0"/>
-          </a:p>
-        </p:txBody>
-      </p:sp>
-      <p:cxnSp>
-        <p:nvCxnSpPr>
-          <p:cNvPr id="148" name="Connector: Elbow 9">
-            <a:extLst>
-              <a:ext uri="{FF2B5EF4-FFF2-40B4-BE49-F238E27FC236}">
-                <a16:creationId xmlns:a16="http://schemas.microsoft.com/office/drawing/2014/main" id="{5E73C07E-9218-47F0-9CDF-BD535681D46E}"/>
-              </a:ext>
-            </a:extLst>
-          </p:cNvPr>
-          <p:cNvCxnSpPr>
-            <a:cxnSpLocks/>
-            <a:stCxn id="9" idx="2"/>
-            <a:endCxn id="65" idx="1"/>
-          </p:cNvCxnSpPr>
-          <p:nvPr/>
-        </p:nvCxnSpPr>
-        <p:spPr>
-          <a:xfrm>
-            <a:off x="7224838" y="2256681"/>
-            <a:ext cx="1101251" cy="1665844"/>
-          </a:xfrm>
-          <a:prstGeom prst="straightConnector1">
-            <a:avLst/>
-          </a:prstGeom>
-          <a:ln w="22225">
-            <a:headEnd type="triangle" w="lg" len="lg"/>
-            <a:tailEnd type="triangle" w="lg" len="lg"/>
-          </a:ln>
-        </p:spPr>
-        <p:style>
-          <a:lnRef idx="1">
-            <a:schemeClr val="accent1"/>
-          </a:lnRef>
-          <a:fillRef idx="0">
-            <a:schemeClr val="accent1"/>
-          </a:fillRef>
-          <a:effectRef idx="0">
-            <a:schemeClr val="accent1"/>
-          </a:effectRef>
-          <a:fontRef idx="minor">
-            <a:schemeClr val="tx1"/>
-          </a:fontRef>
-        </p:style>
-      </p:cxnSp>
       <p:cxnSp>
         <p:nvCxnSpPr>
           <p:cNvPr id="149" name="Connector: Elbow 9">
@@ -10270,50 +10166,6 @@
       </p:cxnSp>
       <p:cxnSp>
         <p:nvCxnSpPr>
-          <p:cNvPr id="205" name="Connector: Elbow 9">
-            <a:extLst>
-              <a:ext uri="{FF2B5EF4-FFF2-40B4-BE49-F238E27FC236}">
-                <a16:creationId xmlns:a16="http://schemas.microsoft.com/office/drawing/2014/main" id="{90BDCAE0-0175-40A9-9408-AA26B3815F99}"/>
-              </a:ext>
-            </a:extLst>
-          </p:cNvPr>
-          <p:cNvCxnSpPr>
-            <a:cxnSpLocks/>
-            <a:stCxn id="62" idx="3"/>
-            <a:endCxn id="14" idx="1"/>
-          </p:cNvCxnSpPr>
-          <p:nvPr/>
-        </p:nvCxnSpPr>
-        <p:spPr>
-          <a:xfrm>
-            <a:off x="1615440" y="5328922"/>
-            <a:ext cx="2044093" cy="162672"/>
-          </a:xfrm>
-          <a:prstGeom prst="straightConnector1">
-            <a:avLst/>
-          </a:prstGeom>
-          <a:ln w="22225">
-            <a:headEnd type="triangle" w="lg" len="lg"/>
-            <a:tailEnd type="triangle" w="lg" len="lg"/>
-          </a:ln>
-        </p:spPr>
-        <p:style>
-          <a:lnRef idx="1">
-            <a:schemeClr val="accent1"/>
-          </a:lnRef>
-          <a:fillRef idx="0">
-            <a:schemeClr val="accent1"/>
-          </a:fillRef>
-          <a:effectRef idx="0">
-            <a:schemeClr val="accent1"/>
-          </a:effectRef>
-          <a:fontRef idx="minor">
-            <a:schemeClr val="tx1"/>
-          </a:fontRef>
-        </p:style>
-      </p:cxnSp>
-      <p:cxnSp>
-        <p:nvCxnSpPr>
           <p:cNvPr id="209" name="Connector: Elbow 9">
             <a:extLst>
               <a:ext uri="{FF2B5EF4-FFF2-40B4-BE49-F238E27FC236}">
@@ -10329,9 +10181,9 @@
           <p:nvPr/>
         </p:nvCxnSpPr>
         <p:spPr>
-          <a:xfrm flipV="1">
-            <a:off x="3270705" y="3922525"/>
-            <a:ext cx="388828" cy="551160"/>
+          <a:xfrm flipH="1" flipV="1">
+            <a:off x="3659533" y="3922525"/>
+            <a:ext cx="1579410" cy="484312"/>
           </a:xfrm>
           <a:prstGeom prst="straightConnector1">
             <a:avLst/>

</xml_diff>